<commit_message>
update slides for 2026
</commit_message>
<xml_diff>
--- a/data-analysis-in-python-slides.pptx
+++ b/data-analysis-in-python-slides.pptx
@@ -6,31 +6,30 @@
     <p:sldMasterId id="2147483660" r:id="rId5"/>
   </p:sldMasterIdLst>
   <p:notesMasterIdLst>
-    <p:notesMasterId r:id="rId18"/>
+    <p:notesMasterId r:id="rId17"/>
   </p:notesMasterIdLst>
   <p:sldIdLst>
     <p:sldId id="339" r:id="rId6"/>
     <p:sldId id="259" r:id="rId7"/>
-    <p:sldId id="344" r:id="rId8"/>
-    <p:sldId id="346" r:id="rId9"/>
-    <p:sldId id="349" r:id="rId10"/>
-    <p:sldId id="347" r:id="rId11"/>
-    <p:sldId id="350" r:id="rId12"/>
-    <p:sldId id="351" r:id="rId13"/>
-    <p:sldId id="340" r:id="rId14"/>
-    <p:sldId id="352" r:id="rId15"/>
-    <p:sldId id="353" r:id="rId16"/>
-    <p:sldId id="354" r:id="rId17"/>
+    <p:sldId id="346" r:id="rId8"/>
+    <p:sldId id="349" r:id="rId9"/>
+    <p:sldId id="347" r:id="rId10"/>
+    <p:sldId id="350" r:id="rId11"/>
+    <p:sldId id="351" r:id="rId12"/>
+    <p:sldId id="340" r:id="rId13"/>
+    <p:sldId id="352" r:id="rId14"/>
+    <p:sldId id="353" r:id="rId15"/>
+    <p:sldId id="354" r:id="rId16"/>
   </p:sldIdLst>
   <p:sldSz cx="12192000" cy="6858000"/>
   <p:notesSz cx="6858000" cy="9144000"/>
   <p:embeddedFontLst>
     <p:embeddedFont>
       <p:font typeface="Source Sans Pro" panose="020B0503030403020204" pitchFamily="34" charset="0"/>
-      <p:regular r:id="rId19"/>
-      <p:bold r:id="rId20"/>
-      <p:italic r:id="rId21"/>
-      <p:boldItalic r:id="rId22"/>
+      <p:regular r:id="rId18"/>
+      <p:bold r:id="rId19"/>
+      <p:italic r:id="rId20"/>
+      <p:boldItalic r:id="rId21"/>
     </p:embeddedFont>
   </p:embeddedFontLst>
   <p:defaultTextStyle>
@@ -449,7 +448,7 @@
           <a:p>
             <a:fld id="{445F5F83-FD4F-410F-8DC2-3FA86C2EE345}" type="datetimeFigureOut">
               <a:rPr lang="en-GB" smtClean="0"/>
-              <a:t>21/11/2024</a:t>
+              <a:t>12/02/2026</a:t>
             </a:fld>
             <a:endParaRPr lang="en-GB"/>
           </a:p>
@@ -717,153 +716,6 @@
 </p:notesMaster>
 </file>
 
-<file path=ppt/notesSlides/notesSlide1.xml><?xml version="1.0" encoding="utf-8"?>
-<p:notes xmlns:a="http://schemas.openxmlformats.org/drawingml/2006/main" xmlns:r="http://schemas.openxmlformats.org/officeDocument/2006/relationships" xmlns:p="http://schemas.openxmlformats.org/presentationml/2006/main">
-  <p:cSld>
-    <p:spTree>
-      <p:nvGrpSpPr>
-        <p:cNvPr id="1" name=""/>
-        <p:cNvGrpSpPr/>
-        <p:nvPr/>
-      </p:nvGrpSpPr>
-      <p:grpSpPr>
-        <a:xfrm>
-          <a:off x="0" y="0"/>
-          <a:ext cx="0" cy="0"/>
-          <a:chOff x="0" y="0"/>
-          <a:chExt cx="0" cy="0"/>
-        </a:xfrm>
-      </p:grpSpPr>
-      <p:sp>
-        <p:nvSpPr>
-          <p:cNvPr id="2" name="Slide Image Placeholder 1"/>
-          <p:cNvSpPr>
-            <a:spLocks noGrp="1" noRot="1" noChangeAspect="1"/>
-          </p:cNvSpPr>
-          <p:nvPr>
-            <p:ph type="sldImg"/>
-          </p:nvPr>
-        </p:nvSpPr>
-        <p:spPr/>
-      </p:sp>
-      <p:sp>
-        <p:nvSpPr>
-          <p:cNvPr id="3" name="Notes Placeholder 2"/>
-          <p:cNvSpPr>
-            <a:spLocks noGrp="1"/>
-          </p:cNvSpPr>
-          <p:nvPr>
-            <p:ph type="body" idx="1"/>
-          </p:nvPr>
-        </p:nvSpPr>
-        <p:spPr/>
-        <p:txBody>
-          <a:bodyPr/>
-          <a:lstStyle/>
-          <a:p>
-            <a:r>
-              <a:rPr lang="en-GB"/>
-              <a:t>A/S</a:t>
-            </a:r>
-          </a:p>
-        </p:txBody>
-      </p:sp>
-      <p:sp>
-        <p:nvSpPr>
-          <p:cNvPr id="4" name="Slide Number Placeholder 3"/>
-          <p:cNvSpPr>
-            <a:spLocks noGrp="1"/>
-          </p:cNvSpPr>
-          <p:nvPr>
-            <p:ph type="sldNum" sz="quarter" idx="10"/>
-          </p:nvPr>
-        </p:nvSpPr>
-        <p:spPr/>
-        <p:txBody>
-          <a:bodyPr/>
-          <a:lstStyle/>
-          <a:p>
-            <a:pPr marL="0" marR="0" lvl="0" indent="0" algn="r" defTabSz="914400" rtl="0" eaLnBrk="1" fontAlgn="auto" latinLnBrk="0" hangingPunct="1">
-              <a:lnSpc>
-                <a:spcPct val="100000"/>
-              </a:lnSpc>
-              <a:spcBef>
-                <a:spcPts val="0"/>
-              </a:spcBef>
-              <a:spcAft>
-                <a:spcPts val="0"/>
-              </a:spcAft>
-              <a:buClrTx/>
-              <a:buSzTx/>
-              <a:buFontTx/>
-              <a:buNone/>
-              <a:tabLst/>
-              <a:defRPr/>
-            </a:pPr>
-            <a:fld id="{8A6A10D0-20D9-4461-9337-5FE1B4A402F6}" type="slidenum">
-              <a:rPr kumimoji="0" lang="en-GB" sz="1200" b="0" i="0" u="none" strike="noStrike" kern="1200" cap="none" spc="0" normalizeH="0" baseline="0" noProof="0" smtClean="0">
-                <a:ln>
-                  <a:noFill/>
-                </a:ln>
-                <a:solidFill>
-                  <a:prstClr val="black"/>
-                </a:solidFill>
-                <a:effectLst/>
-                <a:uLnTx/>
-                <a:uFillTx/>
-                <a:latin typeface="Calibri" panose="020F0502020204030204"/>
-                <a:ea typeface="+mn-ea"/>
-                <a:cs typeface="+mn-cs"/>
-              </a:rPr>
-              <a:pPr marL="0" marR="0" lvl="0" indent="0" algn="r" defTabSz="914400" rtl="0" eaLnBrk="1" fontAlgn="auto" latinLnBrk="0" hangingPunct="1">
-                <a:lnSpc>
-                  <a:spcPct val="100000"/>
-                </a:lnSpc>
-                <a:spcBef>
-                  <a:spcPts val="0"/>
-                </a:spcBef>
-                <a:spcAft>
-                  <a:spcPts val="0"/>
-                </a:spcAft>
-                <a:buClrTx/>
-                <a:buSzTx/>
-                <a:buFontTx/>
-                <a:buNone/>
-                <a:tabLst/>
-                <a:defRPr/>
-              </a:pPr>
-              <a:t>3</a:t>
-            </a:fld>
-            <a:endParaRPr kumimoji="0" lang="en-GB" sz="1200" b="0" i="0" u="none" strike="noStrike" kern="1200" cap="none" spc="0" normalizeH="0" baseline="0" noProof="0">
-              <a:ln>
-                <a:noFill/>
-              </a:ln>
-              <a:solidFill>
-                <a:prstClr val="black"/>
-              </a:solidFill>
-              <a:effectLst/>
-              <a:uLnTx/>
-              <a:uFillTx/>
-              <a:latin typeface="Calibri" panose="020F0502020204030204"/>
-              <a:ea typeface="+mn-ea"/>
-              <a:cs typeface="+mn-cs"/>
-            </a:endParaRPr>
-          </a:p>
-        </p:txBody>
-      </p:sp>
-    </p:spTree>
-    <p:extLst>
-      <p:ext uri="{BB962C8B-B14F-4D97-AF65-F5344CB8AC3E}">
-        <p14:creationId xmlns:p14="http://schemas.microsoft.com/office/powerpoint/2010/main" val="3127709295"/>
-      </p:ext>
-    </p:extLst>
-  </p:cSld>
-  <p:clrMapOvr>
-    <a:masterClrMapping/>
-  </p:clrMapOvr>
-</p:notes>
-</file>
-
 <file path=ppt/slideLayouts/slideLayout1.xml><?xml version="1.0" encoding="utf-8"?>
 <p:sldLayout xmlns:a="http://schemas.openxmlformats.org/drawingml/2006/main" xmlns:r="http://schemas.openxmlformats.org/officeDocument/2006/relationships" xmlns:p="http://schemas.openxmlformats.org/presentationml/2006/main" type="title" preserve="1">
   <p:cSld name="Title Slide">
@@ -995,7 +847,7 @@
           <a:p>
             <a:fld id="{B518E8CF-A517-4FA9-BCB6-845E27B5F7BE}" type="datetimeFigureOut">
               <a:rPr lang="en-GB" smtClean="0"/>
-              <a:t>21/11/2024</a:t>
+              <a:t>12/02/2026</a:t>
             </a:fld>
             <a:endParaRPr lang="en-GB"/>
           </a:p>
@@ -1165,7 +1017,7 @@
           <a:p>
             <a:fld id="{B518E8CF-A517-4FA9-BCB6-845E27B5F7BE}" type="datetimeFigureOut">
               <a:rPr lang="en-GB" smtClean="0"/>
-              <a:t>21/11/2024</a:t>
+              <a:t>12/02/2026</a:t>
             </a:fld>
             <a:endParaRPr lang="en-GB"/>
           </a:p>
@@ -1345,7 +1197,7 @@
           <a:p>
             <a:fld id="{B518E8CF-A517-4FA9-BCB6-845E27B5F7BE}" type="datetimeFigureOut">
               <a:rPr lang="en-GB" smtClean="0"/>
-              <a:t>21/11/2024</a:t>
+              <a:t>12/02/2026</a:t>
             </a:fld>
             <a:endParaRPr lang="en-GB"/>
           </a:p>
@@ -1537,7 +1389,7 @@
           <a:p>
             <a:fld id="{C45D44A4-BF46-4784-BC3D-5888E1A8829D}" type="datetimeFigureOut">
               <a:rPr lang="en-GB" smtClean="0"/>
-              <a:t>21/11/2024</a:t>
+              <a:t>12/02/2026</a:t>
             </a:fld>
             <a:endParaRPr lang="en-GB"/>
           </a:p>
@@ -1712,7 +1564,7 @@
           <a:p>
             <a:fld id="{C45D44A4-BF46-4784-BC3D-5888E1A8829D}" type="datetimeFigureOut">
               <a:rPr lang="en-GB" smtClean="0"/>
-              <a:t>21/11/2024</a:t>
+              <a:t>12/02/2026</a:t>
             </a:fld>
             <a:endParaRPr lang="en-GB"/>
           </a:p>
@@ -1958,7 +1810,7 @@
           <a:p>
             <a:fld id="{C45D44A4-BF46-4784-BC3D-5888E1A8829D}" type="datetimeFigureOut">
               <a:rPr lang="en-GB" smtClean="0"/>
-              <a:t>21/11/2024</a:t>
+              <a:t>12/02/2026</a:t>
             </a:fld>
             <a:endParaRPr lang="en-GB"/>
           </a:p>
@@ -2190,7 +2042,7 @@
           <a:p>
             <a:fld id="{C45D44A4-BF46-4784-BC3D-5888E1A8829D}" type="datetimeFigureOut">
               <a:rPr lang="en-GB" smtClean="0"/>
-              <a:t>21/11/2024</a:t>
+              <a:t>12/02/2026</a:t>
             </a:fld>
             <a:endParaRPr lang="en-GB"/>
           </a:p>
@@ -2557,7 +2409,7 @@
           <a:p>
             <a:fld id="{C45D44A4-BF46-4784-BC3D-5888E1A8829D}" type="datetimeFigureOut">
               <a:rPr lang="en-GB" smtClean="0"/>
-              <a:t>21/11/2024</a:t>
+              <a:t>12/02/2026</a:t>
             </a:fld>
             <a:endParaRPr lang="en-GB"/>
           </a:p>
@@ -2656,7 +2508,7 @@
           <a:p>
             <a:fld id="{C45D44A4-BF46-4784-BC3D-5888E1A8829D}" type="datetimeFigureOut">
               <a:rPr lang="en-GB" smtClean="0"/>
-              <a:t>21/11/2024</a:t>
+              <a:t>12/02/2026</a:t>
             </a:fld>
             <a:endParaRPr lang="en-GB"/>
           </a:p>
@@ -2751,7 +2603,7 @@
           <a:p>
             <a:fld id="{C45D44A4-BF46-4784-BC3D-5888E1A8829D}" type="datetimeFigureOut">
               <a:rPr lang="en-GB" smtClean="0"/>
-              <a:t>21/11/2024</a:t>
+              <a:t>12/02/2026</a:t>
             </a:fld>
             <a:endParaRPr lang="en-GB"/>
           </a:p>
@@ -3028,7 +2880,7 @@
           <a:p>
             <a:fld id="{C45D44A4-BF46-4784-BC3D-5888E1A8829D}" type="datetimeFigureOut">
               <a:rPr lang="en-GB" smtClean="0"/>
-              <a:t>21/11/2024</a:t>
+              <a:t>12/02/2026</a:t>
             </a:fld>
             <a:endParaRPr lang="en-GB"/>
           </a:p>
@@ -3198,7 +3050,7 @@
           <a:p>
             <a:fld id="{B518E8CF-A517-4FA9-BCB6-845E27B5F7BE}" type="datetimeFigureOut">
               <a:rPr lang="en-GB" smtClean="0"/>
-              <a:t>21/11/2024</a:t>
+              <a:t>12/02/2026</a:t>
             </a:fld>
             <a:endParaRPr lang="en-GB"/>
           </a:p>
@@ -3451,7 +3303,7 @@
           <a:p>
             <a:fld id="{C45D44A4-BF46-4784-BC3D-5888E1A8829D}" type="datetimeFigureOut">
               <a:rPr lang="en-GB" smtClean="0"/>
-              <a:t>21/11/2024</a:t>
+              <a:t>12/02/2026</a:t>
             </a:fld>
             <a:endParaRPr lang="en-GB"/>
           </a:p>
@@ -3621,7 +3473,7 @@
           <a:p>
             <a:fld id="{C45D44A4-BF46-4784-BC3D-5888E1A8829D}" type="datetimeFigureOut">
               <a:rPr lang="en-GB" smtClean="0"/>
-              <a:t>21/11/2024</a:t>
+              <a:t>12/02/2026</a:t>
             </a:fld>
             <a:endParaRPr lang="en-GB"/>
           </a:p>
@@ -3801,7 +3653,7 @@
           <a:p>
             <a:fld id="{C45D44A4-BF46-4784-BC3D-5888E1A8829D}" type="datetimeFigureOut">
               <a:rPr lang="en-GB" smtClean="0"/>
-              <a:t>21/11/2024</a:t>
+              <a:t>12/02/2026</a:t>
             </a:fld>
             <a:endParaRPr lang="en-GB"/>
           </a:p>
@@ -4047,7 +3899,7 @@
           <a:p>
             <a:fld id="{B518E8CF-A517-4FA9-BCB6-845E27B5F7BE}" type="datetimeFigureOut">
               <a:rPr lang="en-GB" smtClean="0"/>
-              <a:t>21/11/2024</a:t>
+              <a:t>12/02/2026</a:t>
             </a:fld>
             <a:endParaRPr lang="en-GB"/>
           </a:p>
@@ -4279,7 +4131,7 @@
           <a:p>
             <a:fld id="{B518E8CF-A517-4FA9-BCB6-845E27B5F7BE}" type="datetimeFigureOut">
               <a:rPr lang="en-GB" smtClean="0"/>
-              <a:t>21/11/2024</a:t>
+              <a:t>12/02/2026</a:t>
             </a:fld>
             <a:endParaRPr lang="en-GB"/>
           </a:p>
@@ -4646,7 +4498,7 @@
           <a:p>
             <a:fld id="{B518E8CF-A517-4FA9-BCB6-845E27B5F7BE}" type="datetimeFigureOut">
               <a:rPr lang="en-GB" smtClean="0"/>
-              <a:t>21/11/2024</a:t>
+              <a:t>12/02/2026</a:t>
             </a:fld>
             <a:endParaRPr lang="en-GB"/>
           </a:p>
@@ -4764,7 +4616,7 @@
           <a:p>
             <a:fld id="{B518E8CF-A517-4FA9-BCB6-845E27B5F7BE}" type="datetimeFigureOut">
               <a:rPr lang="en-GB" smtClean="0"/>
-              <a:t>21/11/2024</a:t>
+              <a:t>12/02/2026</a:t>
             </a:fld>
             <a:endParaRPr lang="en-GB"/>
           </a:p>
@@ -4859,7 +4711,7 @@
           <a:p>
             <a:fld id="{B518E8CF-A517-4FA9-BCB6-845E27B5F7BE}" type="datetimeFigureOut">
               <a:rPr lang="en-GB" smtClean="0"/>
-              <a:t>21/11/2024</a:t>
+              <a:t>12/02/2026</a:t>
             </a:fld>
             <a:endParaRPr lang="en-GB"/>
           </a:p>
@@ -5136,7 +4988,7 @@
           <a:p>
             <a:fld id="{B518E8CF-A517-4FA9-BCB6-845E27B5F7BE}" type="datetimeFigureOut">
               <a:rPr lang="en-GB" smtClean="0"/>
-              <a:t>21/11/2024</a:t>
+              <a:t>12/02/2026</a:t>
             </a:fld>
             <a:endParaRPr lang="en-GB"/>
           </a:p>
@@ -5389,7 +5241,7 @@
           <a:p>
             <a:fld id="{B518E8CF-A517-4FA9-BCB6-845E27B5F7BE}" type="datetimeFigureOut">
               <a:rPr lang="en-GB" smtClean="0"/>
-              <a:t>21/11/2024</a:t>
+              <a:t>12/02/2026</a:t>
             </a:fld>
             <a:endParaRPr lang="en-GB"/>
           </a:p>
@@ -5602,7 +5454,7 @@
           <a:p>
             <a:fld id="{B518E8CF-A517-4FA9-BCB6-845E27B5F7BE}" type="datetimeFigureOut">
               <a:rPr lang="en-GB" smtClean="0"/>
-              <a:t>21/11/2024</a:t>
+              <a:t>12/02/2026</a:t>
             </a:fld>
             <a:endParaRPr lang="en-GB"/>
           </a:p>
@@ -6142,7 +5994,7 @@
           <a:p>
             <a:fld id="{C45D44A4-BF46-4784-BC3D-5888E1A8829D}" type="datetimeFigureOut">
               <a:rPr lang="en-GB" smtClean="0"/>
-              <a:t>21/11/2024</a:t>
+              <a:t>12/02/2026</a:t>
             </a:fld>
             <a:endParaRPr lang="en-GB"/>
           </a:p>
@@ -6756,411 +6608,6 @@
         <p:cNvPr id="1" name="">
           <a:extLst>
             <a:ext uri="{FF2B5EF4-FFF2-40B4-BE49-F238E27FC236}">
-              <a16:creationId xmlns:a16="http://schemas.microsoft.com/office/drawing/2014/main" id="{221FE667-E5A5-FD8C-91D3-76AC2CED7544}"/>
-            </a:ext>
-          </a:extLst>
-        </p:cNvPr>
-        <p:cNvGrpSpPr/>
-        <p:nvPr/>
-      </p:nvGrpSpPr>
-      <p:grpSpPr>
-        <a:xfrm>
-          <a:off x="0" y="0"/>
-          <a:ext cx="0" cy="0"/>
-          <a:chOff x="0" y="0"/>
-          <a:chExt cx="0" cy="0"/>
-        </a:xfrm>
-      </p:grpSpPr>
-      <p:sp>
-        <p:nvSpPr>
-          <p:cNvPr id="2" name="Title 1">
-            <a:extLst>
-              <a:ext uri="{FF2B5EF4-FFF2-40B4-BE49-F238E27FC236}">
-                <a16:creationId xmlns:a16="http://schemas.microsoft.com/office/drawing/2014/main" id="{15E39A08-36B8-C784-1CF1-AD01C8439EF1}"/>
-              </a:ext>
-            </a:extLst>
-          </p:cNvPr>
-          <p:cNvSpPr>
-            <a:spLocks noGrp="1"/>
-          </p:cNvSpPr>
-          <p:nvPr>
-            <p:ph type="title"/>
-          </p:nvPr>
-        </p:nvSpPr>
-        <p:spPr/>
-        <p:txBody>
-          <a:bodyPr/>
-          <a:lstStyle/>
-          <a:p>
-            <a:r>
-              <a:rPr lang="en-GB" dirty="0"/>
-              <a:t>Week 2: Plan for today</a:t>
-            </a:r>
-          </a:p>
-        </p:txBody>
-      </p:sp>
-      <p:sp>
-        <p:nvSpPr>
-          <p:cNvPr id="3" name="Content Placeholder 2">
-            <a:extLst>
-              <a:ext uri="{FF2B5EF4-FFF2-40B4-BE49-F238E27FC236}">
-                <a16:creationId xmlns:a16="http://schemas.microsoft.com/office/drawing/2014/main" id="{2DE97532-3E4F-5798-8299-6E35C4970C65}"/>
-              </a:ext>
-            </a:extLst>
-          </p:cNvPr>
-          <p:cNvSpPr>
-            <a:spLocks noGrp="1"/>
-          </p:cNvSpPr>
-          <p:nvPr>
-            <p:ph idx="1"/>
-          </p:nvPr>
-        </p:nvSpPr>
-        <p:spPr>
-          <a:xfrm>
-            <a:off x="838200" y="1690689"/>
-            <a:ext cx="10515600" cy="4165044"/>
-          </a:xfrm>
-        </p:spPr>
-        <p:txBody>
-          <a:bodyPr/>
-          <a:lstStyle/>
-          <a:p>
-            <a:pPr marL="0" indent="0">
-              <a:buNone/>
-            </a:pPr>
-            <a:r>
-              <a:rPr lang="en-GB" b="1" dirty="0"/>
-              <a:t>14:00		</a:t>
-            </a:r>
-            <a:r>
-              <a:rPr lang="en-GB" dirty="0"/>
-              <a:t>Introduction + setup</a:t>
-            </a:r>
-          </a:p>
-          <a:p>
-            <a:pPr marL="0" indent="0">
-              <a:buNone/>
-            </a:pPr>
-            <a:r>
-              <a:rPr lang="en-GB" b="1" dirty="0"/>
-              <a:t>14:15		</a:t>
-            </a:r>
-            <a:r>
-              <a:rPr lang="en-GB" dirty="0"/>
-              <a:t>Programming practical</a:t>
-            </a:r>
-          </a:p>
-          <a:p>
-            <a:pPr marL="0" indent="0">
-              <a:buNone/>
-            </a:pPr>
-            <a:r>
-              <a:rPr lang="en-GB" b="1" dirty="0"/>
-              <a:t>14:55		</a:t>
-            </a:r>
-            <a:r>
-              <a:rPr lang="en-GB" dirty="0"/>
-              <a:t>Break</a:t>
-            </a:r>
-          </a:p>
-          <a:p>
-            <a:pPr marL="0" indent="0">
-              <a:buNone/>
-            </a:pPr>
-            <a:r>
-              <a:rPr lang="en-GB" b="1" dirty="0"/>
-              <a:t>15:05		</a:t>
-            </a:r>
-            <a:r>
-              <a:rPr lang="en-GB" dirty="0"/>
-              <a:t>Brief check-in + common questions</a:t>
-            </a:r>
-            <a:endParaRPr lang="en-GB" b="1" dirty="0"/>
-          </a:p>
-          <a:p>
-            <a:pPr marL="0" indent="0">
-              <a:buNone/>
-            </a:pPr>
-            <a:r>
-              <a:rPr lang="en-GB" b="1" dirty="0"/>
-              <a:t>15:15		</a:t>
-            </a:r>
-            <a:r>
-              <a:rPr lang="en-GB" dirty="0"/>
-              <a:t>Programming practical</a:t>
-            </a:r>
-          </a:p>
-          <a:p>
-            <a:pPr marL="0" indent="0">
-              <a:buNone/>
-            </a:pPr>
-            <a:r>
-              <a:rPr lang="en-GB" b="1" dirty="0"/>
-              <a:t>15:55		</a:t>
-            </a:r>
-            <a:r>
-              <a:rPr lang="en-GB" dirty="0"/>
-              <a:t>Wrap up</a:t>
-            </a:r>
-            <a:endParaRPr lang="en-GB" b="1" dirty="0"/>
-          </a:p>
-        </p:txBody>
-      </p:sp>
-      <p:sp>
-        <p:nvSpPr>
-          <p:cNvPr id="6" name="TextBox 5">
-            <a:extLst>
-              <a:ext uri="{FF2B5EF4-FFF2-40B4-BE49-F238E27FC236}">
-                <a16:creationId xmlns:a16="http://schemas.microsoft.com/office/drawing/2014/main" id="{CDF2F67B-B07A-3E98-6684-829583A3D296}"/>
-              </a:ext>
-            </a:extLst>
-          </p:cNvPr>
-          <p:cNvSpPr txBox="1"/>
-          <p:nvPr/>
-        </p:nvSpPr>
-        <p:spPr>
-          <a:xfrm>
-            <a:off x="6288179" y="4710845"/>
-            <a:ext cx="4294704" cy="1200329"/>
-          </a:xfrm>
-          <a:prstGeom prst="rect">
-            <a:avLst/>
-          </a:prstGeom>
-          <a:noFill/>
-        </p:spPr>
-        <p:txBody>
-          <a:bodyPr wrap="square">
-            <a:spAutoFit/>
-          </a:bodyPr>
-          <a:lstStyle/>
-          <a:p>
-            <a:pPr marL="0" marR="0" lvl="0" indent="0" algn="r" defTabSz="914400" rtl="0" eaLnBrk="1" fontAlgn="auto" latinLnBrk="0" hangingPunct="1">
-              <a:lnSpc>
-                <a:spcPct val="100000"/>
-              </a:lnSpc>
-              <a:spcBef>
-                <a:spcPts val="0"/>
-              </a:spcBef>
-              <a:spcAft>
-                <a:spcPts val="0"/>
-              </a:spcAft>
-              <a:buClrTx/>
-              <a:buSzTx/>
-              <a:buFontTx/>
-              <a:buNone/>
-              <a:tabLst/>
-              <a:defRPr/>
-            </a:pPr>
-            <a:r>
-              <a:rPr kumimoji="0" lang="en-US" sz="2400" b="1" i="0" u="none" strike="noStrike" kern="1200" cap="none" spc="0" normalizeH="0" baseline="0" noProof="0" dirty="0">
-                <a:ln>
-                  <a:noFill/>
-                </a:ln>
-                <a:solidFill>
-                  <a:srgbClr val="4472C4">
-                    <a:lumMod val="50000"/>
-                  </a:srgbClr>
-                </a:solidFill>
-                <a:effectLst/>
-                <a:uLnTx/>
-                <a:uFillTx/>
-                <a:latin typeface="Source Sans Pro" panose="020B0503030403020204" pitchFamily="34" charset="0"/>
-                <a:ea typeface="Source Sans Pro" panose="020B0503030403020204" pitchFamily="34" charset="0"/>
-                <a:cs typeface="+mn-cs"/>
-              </a:rPr>
-              <a:t>Find these slides online:</a:t>
-            </a:r>
-          </a:p>
-          <a:p>
-            <a:pPr marL="0" marR="0" lvl="0" indent="0" algn="r" defTabSz="914400" rtl="0" eaLnBrk="1" fontAlgn="auto" latinLnBrk="0" hangingPunct="1">
-              <a:lnSpc>
-                <a:spcPct val="100000"/>
-              </a:lnSpc>
-              <a:spcBef>
-                <a:spcPts val="0"/>
-              </a:spcBef>
-              <a:spcAft>
-                <a:spcPts val="0"/>
-              </a:spcAft>
-              <a:buClrTx/>
-              <a:buSzTx/>
-              <a:buFontTx/>
-              <a:buNone/>
-              <a:tabLst/>
-              <a:defRPr/>
-            </a:pPr>
-            <a:r>
-              <a:rPr kumimoji="0" lang="en-US" sz="2400" b="0" i="0" u="none" strike="noStrike" kern="1200" cap="none" spc="0" normalizeH="0" baseline="0" noProof="0" dirty="0">
-                <a:ln>
-                  <a:noFill/>
-                </a:ln>
-                <a:solidFill>
-                  <a:srgbClr val="4472C4">
-                    <a:lumMod val="50000"/>
-                  </a:srgbClr>
-                </a:solidFill>
-                <a:effectLst/>
-                <a:uLnTx/>
-                <a:uFillTx/>
-                <a:latin typeface="Source Sans Pro" panose="020B0503030403020204" pitchFamily="34" charset="0"/>
-                <a:ea typeface="Source Sans Pro" panose="020B0503030403020204" pitchFamily="34" charset="0"/>
-                <a:cs typeface="+mn-cs"/>
-                <a:hlinkClick r:id="rId2"/>
-              </a:rPr>
-              <a:t>github.com/DCS-training/</a:t>
-            </a:r>
-            <a:endParaRPr kumimoji="0" lang="en-US" sz="2400" b="0" i="0" u="none" strike="noStrike" kern="1200" cap="none" spc="0" normalizeH="0" baseline="0" noProof="0" dirty="0">
-              <a:ln>
-                <a:noFill/>
-              </a:ln>
-              <a:solidFill>
-                <a:srgbClr val="4472C4">
-                  <a:lumMod val="50000"/>
-                </a:srgbClr>
-              </a:solidFill>
-              <a:effectLst/>
-              <a:uLnTx/>
-              <a:uFillTx/>
-              <a:latin typeface="Source Sans Pro" panose="020B0503030403020204" pitchFamily="34" charset="0"/>
-              <a:ea typeface="Source Sans Pro" panose="020B0503030403020204" pitchFamily="34" charset="0"/>
-              <a:cs typeface="+mn-cs"/>
-              <a:hlinkClick r:id=""/>
-            </a:endParaRPr>
-          </a:p>
-          <a:p>
-            <a:pPr marL="0" marR="0" lvl="0" indent="0" algn="r" defTabSz="914400" rtl="0" eaLnBrk="1" fontAlgn="auto" latinLnBrk="0" hangingPunct="1">
-              <a:lnSpc>
-                <a:spcPct val="100000"/>
-              </a:lnSpc>
-              <a:spcBef>
-                <a:spcPts val="0"/>
-              </a:spcBef>
-              <a:spcAft>
-                <a:spcPts val="0"/>
-              </a:spcAft>
-              <a:buClrTx/>
-              <a:buSzTx/>
-              <a:buFontTx/>
-              <a:buNone/>
-              <a:tabLst/>
-              <a:defRPr/>
-            </a:pPr>
-            <a:r>
-              <a:rPr kumimoji="0" lang="en-US" sz="2400" b="0" i="0" u="none" strike="noStrike" kern="1200" cap="none" spc="0" normalizeH="0" baseline="0" noProof="0" dirty="0">
-                <a:ln>
-                  <a:noFill/>
-                </a:ln>
-                <a:solidFill>
-                  <a:srgbClr val="4472C4">
-                    <a:lumMod val="50000"/>
-                  </a:srgbClr>
-                </a:solidFill>
-                <a:effectLst/>
-                <a:uLnTx/>
-                <a:uFillTx/>
-                <a:latin typeface="Source Sans Pro" panose="020B0503030403020204" pitchFamily="34" charset="0"/>
-                <a:ea typeface="Source Sans Pro" panose="020B0503030403020204" pitchFamily="34" charset="0"/>
-                <a:cs typeface="+mn-cs"/>
-                <a:hlinkClick r:id=""/>
-              </a:rPr>
-              <a:t>data-analysis-in-python</a:t>
-            </a:r>
-            <a:r>
-              <a:rPr kumimoji="0" lang="en-US" sz="2400" b="0" i="0" u="none" strike="noStrike" kern="1200" cap="none" spc="0" normalizeH="0" baseline="0" noProof="0" dirty="0">
-                <a:ln>
-                  <a:noFill/>
-                </a:ln>
-                <a:solidFill>
-                  <a:srgbClr val="4472C4">
-                    <a:lumMod val="50000"/>
-                  </a:srgbClr>
-                </a:solidFill>
-                <a:effectLst/>
-                <a:uLnTx/>
-                <a:uFillTx/>
-                <a:latin typeface="Source Sans Pro" panose="020B0503030403020204" pitchFamily="34" charset="0"/>
-                <a:ea typeface="Source Sans Pro" panose="020B0503030403020204" pitchFamily="34" charset="0"/>
-                <a:cs typeface="+mn-cs"/>
-                <a:hlinkClick r:id="rId2"/>
-              </a:rPr>
-              <a:t> </a:t>
-            </a:r>
-            <a:endParaRPr kumimoji="0" lang="en-US" sz="2400" b="0" i="0" u="none" strike="noStrike" kern="1200" cap="none" spc="0" normalizeH="0" baseline="0" noProof="0" dirty="0">
-              <a:ln>
-                <a:noFill/>
-              </a:ln>
-              <a:solidFill>
-                <a:srgbClr val="4472C4">
-                  <a:lumMod val="50000"/>
-                </a:srgbClr>
-              </a:solidFill>
-              <a:effectLst/>
-              <a:uLnTx/>
-              <a:uFillTx/>
-              <a:latin typeface="Source Sans Pro" panose="020B0503030403020204" pitchFamily="34" charset="0"/>
-              <a:ea typeface="Source Sans Pro" panose="020B0503030403020204" pitchFamily="34" charset="0"/>
-              <a:cs typeface="+mn-cs"/>
-            </a:endParaRPr>
-          </a:p>
-        </p:txBody>
-      </p:sp>
-      <p:pic>
-        <p:nvPicPr>
-          <p:cNvPr id="7" name="Picture 6" descr="A qr code on a white background&#10;&#10;Description automatically generated">
-            <a:extLst>
-              <a:ext uri="{FF2B5EF4-FFF2-40B4-BE49-F238E27FC236}">
-                <a16:creationId xmlns:a16="http://schemas.microsoft.com/office/drawing/2014/main" id="{28BFA8B7-C1F6-825B-476B-546A21D806A5}"/>
-              </a:ext>
-            </a:extLst>
-          </p:cNvPr>
-          <p:cNvPicPr>
-            <a:picLocks noChangeAspect="1"/>
-          </p:cNvPicPr>
-          <p:nvPr/>
-        </p:nvPicPr>
-        <p:blipFill>
-          <a:blip r:embed="rId3" cstate="print">
-            <a:extLst>
-              <a:ext uri="{28A0092B-C50C-407E-A947-70E740481C1C}">
-                <a14:useLocalDpi xmlns:a14="http://schemas.microsoft.com/office/drawing/2010/main" val="0"/>
-              </a:ext>
-            </a:extLst>
-          </a:blip>
-          <a:stretch>
-            <a:fillRect/>
-          </a:stretch>
-        </p:blipFill>
-        <p:spPr>
-          <a:xfrm>
-            <a:off x="10582883" y="4369340"/>
-            <a:ext cx="1541834" cy="1541834"/>
-          </a:xfrm>
-          <a:prstGeom prst="rect">
-            <a:avLst/>
-          </a:prstGeom>
-        </p:spPr>
-      </p:pic>
-    </p:spTree>
-    <p:extLst>
-      <p:ext uri="{BB962C8B-B14F-4D97-AF65-F5344CB8AC3E}">
-        <p14:creationId xmlns:p14="http://schemas.microsoft.com/office/powerpoint/2010/main" val="2544442811"/>
-      </p:ext>
-    </p:extLst>
-  </p:cSld>
-  <p:clrMapOvr>
-    <a:masterClrMapping/>
-  </p:clrMapOvr>
-</p:sld>
-</file>
-
-<file path=ppt/slides/slide11.xml><?xml version="1.0" encoding="utf-8"?>
-<p:sld xmlns:a="http://schemas.openxmlformats.org/drawingml/2006/main" xmlns:r="http://schemas.openxmlformats.org/officeDocument/2006/relationships" xmlns:p="http://schemas.openxmlformats.org/presentationml/2006/main">
-  <p:cSld>
-    <p:spTree>
-      <p:nvGrpSpPr>
-        <p:cNvPr id="1" name="">
-          <a:extLst>
-            <a:ext uri="{FF2B5EF4-FFF2-40B4-BE49-F238E27FC236}">
               <a16:creationId xmlns:a16="http://schemas.microsoft.com/office/drawing/2014/main" id="{051EDDCE-4889-9921-6775-DB67D0153E77}"/>
             </a:ext>
           </a:extLst>
@@ -7246,7 +6693,7 @@
 </p:sld>
 </file>
 
-<file path=ppt/slides/slide12.xml><?xml version="1.0" encoding="utf-8"?>
+<file path=ppt/slides/slide11.xml><?xml version="1.0" encoding="utf-8"?>
 <p:sld xmlns:a="http://schemas.openxmlformats.org/drawingml/2006/main" xmlns:r="http://schemas.openxmlformats.org/officeDocument/2006/relationships" xmlns:p="http://schemas.openxmlformats.org/presentationml/2006/main">
   <p:cSld>
     <p:spTree>
@@ -7885,491 +7332,6 @@
       </p:grpSpPr>
       <p:sp>
         <p:nvSpPr>
-          <p:cNvPr id="11" name="TextBox 10"/>
-          <p:cNvSpPr txBox="1"/>
-          <p:nvPr/>
-        </p:nvSpPr>
-        <p:spPr>
-          <a:xfrm>
-            <a:off x="234967" y="1966349"/>
-            <a:ext cx="184731" cy="646331"/>
-          </a:xfrm>
-          <a:prstGeom prst="rect">
-            <a:avLst/>
-          </a:prstGeom>
-          <a:noFill/>
-        </p:spPr>
-        <p:txBody>
-          <a:bodyPr wrap="none" rtlCol="0">
-            <a:spAutoFit/>
-          </a:bodyPr>
-          <a:lstStyle/>
-          <a:p>
-            <a:pPr marL="0" marR="0" lvl="0" indent="0" algn="l" defTabSz="914400" rtl="0" eaLnBrk="1" fontAlgn="auto" latinLnBrk="0" hangingPunct="1">
-              <a:lnSpc>
-                <a:spcPct val="100000"/>
-              </a:lnSpc>
-              <a:spcBef>
-                <a:spcPts val="0"/>
-              </a:spcBef>
-              <a:spcAft>
-                <a:spcPts val="0"/>
-              </a:spcAft>
-              <a:buClrTx/>
-              <a:buSzTx/>
-              <a:buFontTx/>
-              <a:buNone/>
-              <a:tabLst/>
-              <a:defRPr/>
-            </a:pPr>
-            <a:endParaRPr kumimoji="0" lang="en-GB" sz="1800" b="0" i="0" u="none" strike="noStrike" kern="1200" cap="none" spc="0" normalizeH="0" baseline="0" noProof="0">
-              <a:ln>
-                <a:noFill/>
-              </a:ln>
-              <a:solidFill>
-                <a:srgbClr val="002E5F"/>
-              </a:solidFill>
-              <a:effectLst/>
-              <a:uLnTx/>
-              <a:uFillTx/>
-              <a:latin typeface="Source Sans Pro" panose="020B0503030403020204" pitchFamily="34" charset="0"/>
-              <a:ea typeface="+mn-ea"/>
-              <a:cs typeface="+mn-cs"/>
-            </a:endParaRPr>
-          </a:p>
-          <a:p>
-            <a:pPr marL="0" marR="0" lvl="0" indent="0" algn="l" defTabSz="914400" rtl="0" eaLnBrk="1" fontAlgn="auto" latinLnBrk="0" hangingPunct="1">
-              <a:lnSpc>
-                <a:spcPct val="100000"/>
-              </a:lnSpc>
-              <a:spcBef>
-                <a:spcPts val="0"/>
-              </a:spcBef>
-              <a:spcAft>
-                <a:spcPts val="0"/>
-              </a:spcAft>
-              <a:buClrTx/>
-              <a:buSzTx/>
-              <a:buFontTx/>
-              <a:buNone/>
-              <a:tabLst/>
-              <a:defRPr/>
-            </a:pPr>
-            <a:endParaRPr kumimoji="0" lang="en-GB" sz="1800" b="0" i="0" u="none" strike="noStrike" kern="1200" cap="none" spc="0" normalizeH="0" baseline="0" noProof="0">
-              <a:ln>
-                <a:noFill/>
-              </a:ln>
-              <a:solidFill>
-                <a:srgbClr val="002E5F"/>
-              </a:solidFill>
-              <a:effectLst/>
-              <a:uLnTx/>
-              <a:uFillTx/>
-              <a:latin typeface="Source Sans Pro" panose="020B0503030403020204" pitchFamily="34" charset="0"/>
-              <a:ea typeface="+mn-ea"/>
-              <a:cs typeface="+mn-cs"/>
-            </a:endParaRPr>
-          </a:p>
-        </p:txBody>
-      </p:sp>
-      <p:sp>
-        <p:nvSpPr>
-          <p:cNvPr id="3" name="TextBox 2">
-            <a:extLst>
-              <a:ext uri="{FF2B5EF4-FFF2-40B4-BE49-F238E27FC236}">
-                <a16:creationId xmlns:a16="http://schemas.microsoft.com/office/drawing/2014/main" id="{99B831FA-DE59-FB51-2407-8EEDF253A512}"/>
-              </a:ext>
-            </a:extLst>
-          </p:cNvPr>
-          <p:cNvSpPr txBox="1"/>
-          <p:nvPr/>
-        </p:nvSpPr>
-        <p:spPr>
-          <a:xfrm>
-            <a:off x="4504859" y="546883"/>
-            <a:ext cx="2999387" cy="707886"/>
-          </a:xfrm>
-          <a:prstGeom prst="rect">
-            <a:avLst/>
-          </a:prstGeom>
-          <a:noFill/>
-        </p:spPr>
-        <p:txBody>
-          <a:bodyPr rot="0" spcFirstLastPara="0" vertOverflow="overflow" horzOverflow="overflow" vert="horz" wrap="square" lIns="91440" tIns="45720" rIns="91440" bIns="45720" numCol="1" spcCol="0" rtlCol="0" fromWordArt="0" anchor="t" anchorCtr="0" forceAA="0" compatLnSpc="1">
-            <a:prstTxWarp prst="textNoShape">
-              <a:avLst/>
-            </a:prstTxWarp>
-            <a:spAutoFit/>
-          </a:bodyPr>
-          <a:lstStyle/>
-          <a:p>
-            <a:pPr marL="0" marR="0" lvl="0" indent="0" algn="ctr" defTabSz="914400" rtl="0" eaLnBrk="1" fontAlgn="auto" latinLnBrk="0" hangingPunct="1">
-              <a:lnSpc>
-                <a:spcPct val="100000"/>
-              </a:lnSpc>
-              <a:spcBef>
-                <a:spcPts val="0"/>
-              </a:spcBef>
-              <a:spcAft>
-                <a:spcPts val="0"/>
-              </a:spcAft>
-              <a:buClrTx/>
-              <a:buSzTx/>
-              <a:buFontTx/>
-              <a:buNone/>
-              <a:tabLst/>
-              <a:defRPr/>
-            </a:pPr>
-            <a:r>
-              <a:rPr kumimoji="0" lang="en-GB" sz="4000" b="1" i="0" u="none" strike="noStrike" kern="1200" cap="none" spc="0" normalizeH="0" baseline="0" noProof="0">
-                <a:ln>
-                  <a:noFill/>
-                </a:ln>
-                <a:solidFill>
-                  <a:srgbClr val="002060"/>
-                </a:solidFill>
-                <a:effectLst/>
-                <a:uLnTx/>
-                <a:uFillTx/>
-                <a:latin typeface="Source Sans Pro"/>
-                <a:ea typeface="Source Sans Pro"/>
-                <a:cs typeface="Calibri"/>
-              </a:rPr>
-              <a:t>Welcome!</a:t>
-            </a:r>
-            <a:endParaRPr kumimoji="0" lang="en-GB" sz="4000" b="0" i="1" u="none" strike="noStrike" kern="1200" cap="none" spc="0" normalizeH="0" baseline="0" noProof="0">
-              <a:ln>
-                <a:noFill/>
-              </a:ln>
-              <a:solidFill>
-                <a:srgbClr val="002060"/>
-              </a:solidFill>
-              <a:effectLst/>
-              <a:uLnTx/>
-              <a:uFillTx/>
-              <a:latin typeface="Source Sans Pro"/>
-              <a:ea typeface="Source Sans Pro"/>
-              <a:cs typeface="Calibri"/>
-            </a:endParaRPr>
-          </a:p>
-        </p:txBody>
-      </p:sp>
-      <p:pic>
-        <p:nvPicPr>
-          <p:cNvPr id="2" name="Picture 1" descr="A person smiling at camera&#10;&#10;Description automatically generated">
-            <a:extLst>
-              <a:ext uri="{FF2B5EF4-FFF2-40B4-BE49-F238E27FC236}">
-                <a16:creationId xmlns:a16="http://schemas.microsoft.com/office/drawing/2014/main" id="{2B834028-C3AD-B014-CE9A-779FDDE5425D}"/>
-              </a:ext>
-            </a:extLst>
-          </p:cNvPr>
-          <p:cNvPicPr>
-            <a:picLocks noChangeAspect="1"/>
-          </p:cNvPicPr>
-          <p:nvPr/>
-        </p:nvPicPr>
-        <p:blipFill rotWithShape="1">
-          <a:blip r:embed="rId3"/>
-          <a:srcRect l="19973" r="23184"/>
-          <a:stretch/>
-        </p:blipFill>
-        <p:spPr>
-          <a:xfrm>
-            <a:off x="7192494" y="1390251"/>
-            <a:ext cx="2957189" cy="2936298"/>
-          </a:xfrm>
-          <a:prstGeom prst="rect">
-            <a:avLst/>
-          </a:prstGeom>
-        </p:spPr>
-      </p:pic>
-      <p:sp>
-        <p:nvSpPr>
-          <p:cNvPr id="5" name="TextBox 4">
-            <a:extLst>
-              <a:ext uri="{FF2B5EF4-FFF2-40B4-BE49-F238E27FC236}">
-                <a16:creationId xmlns:a16="http://schemas.microsoft.com/office/drawing/2014/main" id="{EC49EED0-BB6F-F848-059F-858C099A6512}"/>
-              </a:ext>
-            </a:extLst>
-          </p:cNvPr>
-          <p:cNvSpPr txBox="1"/>
-          <p:nvPr/>
-        </p:nvSpPr>
-        <p:spPr>
-          <a:xfrm>
-            <a:off x="2266903" y="4430768"/>
-            <a:ext cx="2999387" cy="892552"/>
-          </a:xfrm>
-          <a:prstGeom prst="rect">
-            <a:avLst/>
-          </a:prstGeom>
-          <a:noFill/>
-        </p:spPr>
-        <p:txBody>
-          <a:bodyPr rot="0" spcFirstLastPara="0" vertOverflow="overflow" horzOverflow="overflow" vert="horz" wrap="square" lIns="91440" tIns="45720" rIns="91440" bIns="45720" numCol="1" spcCol="0" rtlCol="0" fromWordArt="0" anchor="t" anchorCtr="0" forceAA="0" compatLnSpc="1">
-            <a:prstTxWarp prst="textNoShape">
-              <a:avLst/>
-            </a:prstTxWarp>
-            <a:spAutoFit/>
-          </a:bodyPr>
-          <a:lstStyle/>
-          <a:p>
-            <a:pPr marL="0" marR="0" lvl="0" indent="0" algn="l" defTabSz="914400" rtl="0" eaLnBrk="1" fontAlgn="auto" latinLnBrk="0" hangingPunct="1">
-              <a:lnSpc>
-                <a:spcPct val="100000"/>
-              </a:lnSpc>
-              <a:spcBef>
-                <a:spcPts val="0"/>
-              </a:spcBef>
-              <a:spcAft>
-                <a:spcPts val="0"/>
-              </a:spcAft>
-              <a:buClrTx/>
-              <a:buSzTx/>
-              <a:buFontTx/>
-              <a:buNone/>
-              <a:tabLst/>
-              <a:defRPr/>
-            </a:pPr>
-            <a:r>
-              <a:rPr kumimoji="0" lang="en-US" sz="3200" b="1" i="0" u="none" strike="noStrike" kern="1200" cap="none" spc="0" normalizeH="0" baseline="0" noProof="0" dirty="0">
-                <a:ln>
-                  <a:noFill/>
-                </a:ln>
-                <a:solidFill>
-                  <a:srgbClr val="002060"/>
-                </a:solidFill>
-                <a:effectLst/>
-                <a:uLnTx/>
-                <a:uFillTx/>
-                <a:latin typeface="Source Sans Pro" panose="020B0503030403020204" pitchFamily="34" charset="0"/>
-                <a:ea typeface="Source Sans Pro" panose="020B0503030403020204" pitchFamily="34" charset="0"/>
-                <a:cs typeface="+mn-cs"/>
-              </a:rPr>
-              <a:t>Aislinn Keogh</a:t>
-            </a:r>
-          </a:p>
-          <a:p>
-            <a:pPr marL="0" marR="0" lvl="0" indent="0" algn="l" defTabSz="914400" rtl="0" eaLnBrk="1" fontAlgn="auto" latinLnBrk="0" hangingPunct="1">
-              <a:lnSpc>
-                <a:spcPct val="100000"/>
-              </a:lnSpc>
-              <a:spcBef>
-                <a:spcPts val="0"/>
-              </a:spcBef>
-              <a:spcAft>
-                <a:spcPts val="0"/>
-              </a:spcAft>
-              <a:buClrTx/>
-              <a:buSzTx/>
-              <a:buFontTx/>
-              <a:buNone/>
-              <a:tabLst/>
-              <a:defRPr/>
-            </a:pPr>
-            <a:r>
-              <a:rPr kumimoji="0" lang="en-GB" sz="2000" b="0" i="0" u="none" strike="noStrike" kern="1200" cap="none" spc="0" normalizeH="0" baseline="0" noProof="0" dirty="0">
-                <a:ln>
-                  <a:noFill/>
-                </a:ln>
-                <a:solidFill>
-                  <a:srgbClr val="002060"/>
-                </a:solidFill>
-                <a:effectLst/>
-                <a:uLnTx/>
-                <a:uFillTx/>
-                <a:latin typeface="Source Sans Pro"/>
-                <a:ea typeface="Source Sans Pro"/>
-                <a:cs typeface="Calibri"/>
-              </a:rPr>
-              <a:t>PhD student in Linguistics</a:t>
-            </a:r>
-          </a:p>
-        </p:txBody>
-      </p:sp>
-      <p:sp>
-        <p:nvSpPr>
-          <p:cNvPr id="6" name="TextBox 5">
-            <a:extLst>
-              <a:ext uri="{FF2B5EF4-FFF2-40B4-BE49-F238E27FC236}">
-                <a16:creationId xmlns:a16="http://schemas.microsoft.com/office/drawing/2014/main" id="{40928F44-9683-5783-FE8A-08D8461BDEB2}"/>
-              </a:ext>
-            </a:extLst>
-          </p:cNvPr>
-          <p:cNvSpPr txBox="1"/>
-          <p:nvPr/>
-        </p:nvSpPr>
-        <p:spPr>
-          <a:xfrm>
-            <a:off x="6524350" y="4276879"/>
-            <a:ext cx="4293475" cy="1200329"/>
-          </a:xfrm>
-          <a:prstGeom prst="rect">
-            <a:avLst/>
-          </a:prstGeom>
-          <a:noFill/>
-        </p:spPr>
-        <p:txBody>
-          <a:bodyPr rot="0" spcFirstLastPara="0" vertOverflow="overflow" horzOverflow="overflow" vert="horz" wrap="square" lIns="91440" tIns="45720" rIns="91440" bIns="45720" numCol="1" spcCol="0" rtlCol="0" fromWordArt="0" anchor="t" anchorCtr="0" forceAA="0" compatLnSpc="1">
-            <a:prstTxWarp prst="textNoShape">
-              <a:avLst/>
-            </a:prstTxWarp>
-            <a:spAutoFit/>
-          </a:bodyPr>
-          <a:lstStyle/>
-          <a:p>
-            <a:pPr marL="0" marR="0" lvl="0" indent="0" algn="ctr" defTabSz="914400" rtl="0" eaLnBrk="1" fontAlgn="auto" latinLnBrk="0" hangingPunct="1">
-              <a:lnSpc>
-                <a:spcPct val="100000"/>
-              </a:lnSpc>
-              <a:spcBef>
-                <a:spcPts val="0"/>
-              </a:spcBef>
-              <a:spcAft>
-                <a:spcPts val="0"/>
-              </a:spcAft>
-              <a:buClrTx/>
-              <a:buSzTx/>
-              <a:buFontTx/>
-              <a:buNone/>
-              <a:tabLst/>
-              <a:defRPr/>
-            </a:pPr>
-            <a:r>
-              <a:rPr kumimoji="0" lang="en-GB" sz="3200" b="1" i="0" u="none" strike="noStrike" kern="1200" cap="none" spc="0" normalizeH="0" baseline="0" noProof="0" dirty="0">
-                <a:ln>
-                  <a:noFill/>
-                </a:ln>
-                <a:solidFill>
-                  <a:srgbClr val="002060"/>
-                </a:solidFill>
-                <a:effectLst/>
-                <a:uLnTx/>
-                <a:uFillTx/>
-                <a:latin typeface="Source Sans Pro"/>
-                <a:ea typeface="Source Sans Pro"/>
-                <a:cs typeface="Calibri"/>
-              </a:rPr>
-              <a:t>Sarah Schöttler</a:t>
-            </a:r>
-          </a:p>
-          <a:p>
-            <a:pPr marL="0" marR="0" lvl="0" indent="0" algn="ctr" defTabSz="914400" rtl="0" eaLnBrk="1" fontAlgn="auto" latinLnBrk="0" hangingPunct="1">
-              <a:lnSpc>
-                <a:spcPct val="100000"/>
-              </a:lnSpc>
-              <a:spcBef>
-                <a:spcPts val="0"/>
-              </a:spcBef>
-              <a:spcAft>
-                <a:spcPts val="0"/>
-              </a:spcAft>
-              <a:buClrTx/>
-              <a:buSzTx/>
-              <a:buFontTx/>
-              <a:buNone/>
-              <a:tabLst/>
-              <a:defRPr/>
-            </a:pPr>
-            <a:r>
-              <a:rPr kumimoji="0" lang="en-GB" sz="2000" b="0" i="0" u="none" strike="noStrike" kern="1200" cap="none" spc="0" normalizeH="0" baseline="0" noProof="0" dirty="0">
-                <a:ln>
-                  <a:noFill/>
-                </a:ln>
-                <a:solidFill>
-                  <a:srgbClr val="002060"/>
-                </a:solidFill>
-                <a:effectLst/>
-                <a:uLnTx/>
-                <a:uFillTx/>
-                <a:latin typeface="Source Sans Pro"/>
-                <a:ea typeface="Source Sans Pro"/>
-                <a:cs typeface="Calibri"/>
-              </a:rPr>
-              <a:t>PhD student in data visualization &amp; visualization developer</a:t>
-            </a:r>
-          </a:p>
-        </p:txBody>
-      </p:sp>
-      <p:pic>
-        <p:nvPicPr>
-          <p:cNvPr id="1026" name="Picture 2">
-            <a:extLst>
-              <a:ext uri="{FF2B5EF4-FFF2-40B4-BE49-F238E27FC236}">
-                <a16:creationId xmlns:a16="http://schemas.microsoft.com/office/drawing/2014/main" id="{E3532E6E-2253-1F41-9528-A03E2648DDAF}"/>
-              </a:ext>
-            </a:extLst>
-          </p:cNvPr>
-          <p:cNvPicPr>
-            <a:picLocks noChangeAspect="1" noChangeArrowheads="1"/>
-          </p:cNvPicPr>
-          <p:nvPr/>
-        </p:nvPicPr>
-        <p:blipFill>
-          <a:blip r:embed="rId4" cstate="print">
-            <a:extLst>
-              <a:ext uri="{28A0092B-C50C-407E-A947-70E740481C1C}">
-                <a14:useLocalDpi xmlns:a14="http://schemas.microsoft.com/office/drawing/2010/main" val="0"/>
-              </a:ext>
-            </a:extLst>
-          </a:blip>
-          <a:srcRect/>
-          <a:stretch>
-            <a:fillRect/>
-          </a:stretch>
-        </p:blipFill>
-        <p:spPr bwMode="auto">
-          <a:xfrm>
-            <a:off x="2627059" y="1390251"/>
-            <a:ext cx="2279073" cy="2992582"/>
-          </a:xfrm>
-          <a:prstGeom prst="rect">
-            <a:avLst/>
-          </a:prstGeom>
-          <a:noFill/>
-          <a:extLst>
-            <a:ext uri="{909E8E84-426E-40DD-AFC4-6F175D3DCCD1}">
-              <a14:hiddenFill xmlns:a14="http://schemas.microsoft.com/office/drawing/2010/main">
-                <a:solidFill>
-                  <a:srgbClr val="FFFFFF"/>
-                </a:solidFill>
-              </a14:hiddenFill>
-            </a:ext>
-          </a:extLst>
-        </p:spPr>
-      </p:pic>
-    </p:spTree>
-    <p:extLst>
-      <p:ext uri="{BB962C8B-B14F-4D97-AF65-F5344CB8AC3E}">
-        <p14:creationId xmlns:p14="http://schemas.microsoft.com/office/powerpoint/2010/main" val="1868972405"/>
-      </p:ext>
-    </p:extLst>
-  </p:cSld>
-  <p:clrMapOvr>
-    <a:masterClrMapping/>
-  </p:clrMapOvr>
-</p:sld>
-</file>
-
-<file path=ppt/slides/slide4.xml><?xml version="1.0" encoding="utf-8"?>
-<p:sld xmlns:a="http://schemas.openxmlformats.org/drawingml/2006/main" xmlns:r="http://schemas.openxmlformats.org/officeDocument/2006/relationships" xmlns:p="http://schemas.openxmlformats.org/presentationml/2006/main">
-  <p:cSld>
-    <p:spTree>
-      <p:nvGrpSpPr>
-        <p:cNvPr id="1" name=""/>
-        <p:cNvGrpSpPr/>
-        <p:nvPr/>
-      </p:nvGrpSpPr>
-      <p:grpSpPr>
-        <a:xfrm>
-          <a:off x="0" y="0"/>
-          <a:ext cx="0" cy="0"/>
-          <a:chOff x="0" y="0"/>
-          <a:chExt cx="0" cy="0"/>
-        </a:xfrm>
-      </p:grpSpPr>
-      <p:sp>
-        <p:nvSpPr>
           <p:cNvPr id="2" name="Title 1">
             <a:extLst>
               <a:ext uri="{FF2B5EF4-FFF2-40B4-BE49-F238E27FC236}">
@@ -8637,7 +7599,7 @@
 </p:sld>
 </file>
 
-<file path=ppt/slides/slide5.xml><?xml version="1.0" encoding="utf-8"?>
+<file path=ppt/slides/slide4.xml><?xml version="1.0" encoding="utf-8"?>
 <p:sld xmlns:a="http://schemas.openxmlformats.org/drawingml/2006/main" xmlns:r="http://schemas.openxmlformats.org/officeDocument/2006/relationships" xmlns:p="http://schemas.openxmlformats.org/presentationml/2006/main">
   <p:cSld>
     <p:spTree>
@@ -9350,7 +8312,7 @@
 </p:sld>
 </file>
 
-<file path=ppt/slides/slide6.xml><?xml version="1.0" encoding="utf-8"?>
+<file path=ppt/slides/slide5.xml><?xml version="1.0" encoding="utf-8"?>
 <p:sld xmlns:a="http://schemas.openxmlformats.org/drawingml/2006/main" xmlns:r="http://schemas.openxmlformats.org/officeDocument/2006/relationships" xmlns:p="http://schemas.openxmlformats.org/presentationml/2006/main">
   <p:cSld>
     <p:spTree>
@@ -9792,7 +8754,7 @@
 </p:sld>
 </file>
 
-<file path=ppt/slides/slide7.xml><?xml version="1.0" encoding="utf-8"?>
+<file path=ppt/slides/slide6.xml><?xml version="1.0" encoding="utf-8"?>
 <p:sld xmlns:a="http://schemas.openxmlformats.org/drawingml/2006/main" xmlns:r="http://schemas.openxmlformats.org/officeDocument/2006/relationships" xmlns:p="http://schemas.openxmlformats.org/presentationml/2006/main">
   <p:cSld>
     <p:spTree>
@@ -9879,7 +8841,7 @@
 </p:sld>
 </file>
 
-<file path=ppt/slides/slide8.xml><?xml version="1.0" encoding="utf-8"?>
+<file path=ppt/slides/slide7.xml><?xml version="1.0" encoding="utf-8"?>
 <p:sld xmlns:a="http://schemas.openxmlformats.org/drawingml/2006/main" xmlns:r="http://schemas.openxmlformats.org/officeDocument/2006/relationships" xmlns:p="http://schemas.openxmlformats.org/presentationml/2006/main">
   <p:cSld>
     <p:spTree>
@@ -10109,7 +9071,7 @@
 </p:sld>
 </file>
 
-<file path=ppt/slides/slide9.xml><?xml version="1.0" encoding="utf-8"?>
+<file path=ppt/slides/slide8.xml><?xml version="1.0" encoding="utf-8"?>
 <p:sld xmlns:a="http://schemas.openxmlformats.org/drawingml/2006/main" xmlns:r="http://schemas.openxmlformats.org/officeDocument/2006/relationships" xmlns:p="http://schemas.openxmlformats.org/presentationml/2006/main">
   <p:cSld>
     <p:spTree>
@@ -10220,6 +9182,411 @@
     <p:extLst>
       <p:ext uri="{BB962C8B-B14F-4D97-AF65-F5344CB8AC3E}">
         <p14:creationId xmlns:p14="http://schemas.microsoft.com/office/powerpoint/2010/main" val="4214563480"/>
+      </p:ext>
+    </p:extLst>
+  </p:cSld>
+  <p:clrMapOvr>
+    <a:masterClrMapping/>
+  </p:clrMapOvr>
+</p:sld>
+</file>
+
+<file path=ppt/slides/slide9.xml><?xml version="1.0" encoding="utf-8"?>
+<p:sld xmlns:a="http://schemas.openxmlformats.org/drawingml/2006/main" xmlns:r="http://schemas.openxmlformats.org/officeDocument/2006/relationships" xmlns:p="http://schemas.openxmlformats.org/presentationml/2006/main">
+  <p:cSld>
+    <p:spTree>
+      <p:nvGrpSpPr>
+        <p:cNvPr id="1" name="">
+          <a:extLst>
+            <a:ext uri="{FF2B5EF4-FFF2-40B4-BE49-F238E27FC236}">
+              <a16:creationId xmlns:a16="http://schemas.microsoft.com/office/drawing/2014/main" id="{221FE667-E5A5-FD8C-91D3-76AC2CED7544}"/>
+            </a:ext>
+          </a:extLst>
+        </p:cNvPr>
+        <p:cNvGrpSpPr/>
+        <p:nvPr/>
+      </p:nvGrpSpPr>
+      <p:grpSpPr>
+        <a:xfrm>
+          <a:off x="0" y="0"/>
+          <a:ext cx="0" cy="0"/>
+          <a:chOff x="0" y="0"/>
+          <a:chExt cx="0" cy="0"/>
+        </a:xfrm>
+      </p:grpSpPr>
+      <p:sp>
+        <p:nvSpPr>
+          <p:cNvPr id="2" name="Title 1">
+            <a:extLst>
+              <a:ext uri="{FF2B5EF4-FFF2-40B4-BE49-F238E27FC236}">
+                <a16:creationId xmlns:a16="http://schemas.microsoft.com/office/drawing/2014/main" id="{15E39A08-36B8-C784-1CF1-AD01C8439EF1}"/>
+              </a:ext>
+            </a:extLst>
+          </p:cNvPr>
+          <p:cNvSpPr>
+            <a:spLocks noGrp="1"/>
+          </p:cNvSpPr>
+          <p:nvPr>
+            <p:ph type="title"/>
+          </p:nvPr>
+        </p:nvSpPr>
+        <p:spPr/>
+        <p:txBody>
+          <a:bodyPr/>
+          <a:lstStyle/>
+          <a:p>
+            <a:r>
+              <a:rPr lang="en-GB" dirty="0"/>
+              <a:t>Week 2: Plan for today</a:t>
+            </a:r>
+          </a:p>
+        </p:txBody>
+      </p:sp>
+      <p:sp>
+        <p:nvSpPr>
+          <p:cNvPr id="3" name="Content Placeholder 2">
+            <a:extLst>
+              <a:ext uri="{FF2B5EF4-FFF2-40B4-BE49-F238E27FC236}">
+                <a16:creationId xmlns:a16="http://schemas.microsoft.com/office/drawing/2014/main" id="{2DE97532-3E4F-5798-8299-6E35C4970C65}"/>
+              </a:ext>
+            </a:extLst>
+          </p:cNvPr>
+          <p:cNvSpPr>
+            <a:spLocks noGrp="1"/>
+          </p:cNvSpPr>
+          <p:nvPr>
+            <p:ph idx="1"/>
+          </p:nvPr>
+        </p:nvSpPr>
+        <p:spPr>
+          <a:xfrm>
+            <a:off x="838200" y="1690689"/>
+            <a:ext cx="10515600" cy="4165044"/>
+          </a:xfrm>
+        </p:spPr>
+        <p:txBody>
+          <a:bodyPr/>
+          <a:lstStyle/>
+          <a:p>
+            <a:pPr marL="0" indent="0">
+              <a:buNone/>
+            </a:pPr>
+            <a:r>
+              <a:rPr lang="en-GB" b="1" dirty="0"/>
+              <a:t>14:00		</a:t>
+            </a:r>
+            <a:r>
+              <a:rPr lang="en-GB" dirty="0"/>
+              <a:t>Introduction + setup</a:t>
+            </a:r>
+          </a:p>
+          <a:p>
+            <a:pPr marL="0" indent="0">
+              <a:buNone/>
+            </a:pPr>
+            <a:r>
+              <a:rPr lang="en-GB" b="1" dirty="0"/>
+              <a:t>14:15		</a:t>
+            </a:r>
+            <a:r>
+              <a:rPr lang="en-GB" dirty="0"/>
+              <a:t>Programming practical</a:t>
+            </a:r>
+          </a:p>
+          <a:p>
+            <a:pPr marL="0" indent="0">
+              <a:buNone/>
+            </a:pPr>
+            <a:r>
+              <a:rPr lang="en-GB" b="1" dirty="0"/>
+              <a:t>14:55		</a:t>
+            </a:r>
+            <a:r>
+              <a:rPr lang="en-GB" dirty="0"/>
+              <a:t>Break</a:t>
+            </a:r>
+          </a:p>
+          <a:p>
+            <a:pPr marL="0" indent="0">
+              <a:buNone/>
+            </a:pPr>
+            <a:r>
+              <a:rPr lang="en-GB" b="1" dirty="0"/>
+              <a:t>15:05		</a:t>
+            </a:r>
+            <a:r>
+              <a:rPr lang="en-GB" dirty="0"/>
+              <a:t>Brief check-in + common questions</a:t>
+            </a:r>
+            <a:endParaRPr lang="en-GB" b="1" dirty="0"/>
+          </a:p>
+          <a:p>
+            <a:pPr marL="0" indent="0">
+              <a:buNone/>
+            </a:pPr>
+            <a:r>
+              <a:rPr lang="en-GB" b="1" dirty="0"/>
+              <a:t>15:15		</a:t>
+            </a:r>
+            <a:r>
+              <a:rPr lang="en-GB" dirty="0"/>
+              <a:t>Programming practical</a:t>
+            </a:r>
+          </a:p>
+          <a:p>
+            <a:pPr marL="0" indent="0">
+              <a:buNone/>
+            </a:pPr>
+            <a:r>
+              <a:rPr lang="en-GB" b="1" dirty="0"/>
+              <a:t>15:55		</a:t>
+            </a:r>
+            <a:r>
+              <a:rPr lang="en-GB" dirty="0"/>
+              <a:t>Wrap up</a:t>
+            </a:r>
+            <a:endParaRPr lang="en-GB" b="1" dirty="0"/>
+          </a:p>
+        </p:txBody>
+      </p:sp>
+      <p:sp>
+        <p:nvSpPr>
+          <p:cNvPr id="6" name="TextBox 5">
+            <a:extLst>
+              <a:ext uri="{FF2B5EF4-FFF2-40B4-BE49-F238E27FC236}">
+                <a16:creationId xmlns:a16="http://schemas.microsoft.com/office/drawing/2014/main" id="{CDF2F67B-B07A-3E98-6684-829583A3D296}"/>
+              </a:ext>
+            </a:extLst>
+          </p:cNvPr>
+          <p:cNvSpPr txBox="1"/>
+          <p:nvPr/>
+        </p:nvSpPr>
+        <p:spPr>
+          <a:xfrm>
+            <a:off x="6288179" y="4710845"/>
+            <a:ext cx="4294704" cy="1200329"/>
+          </a:xfrm>
+          <a:prstGeom prst="rect">
+            <a:avLst/>
+          </a:prstGeom>
+          <a:noFill/>
+        </p:spPr>
+        <p:txBody>
+          <a:bodyPr wrap="square">
+            <a:spAutoFit/>
+          </a:bodyPr>
+          <a:lstStyle/>
+          <a:p>
+            <a:pPr marL="0" marR="0" lvl="0" indent="0" algn="r" defTabSz="914400" rtl="0" eaLnBrk="1" fontAlgn="auto" latinLnBrk="0" hangingPunct="1">
+              <a:lnSpc>
+                <a:spcPct val="100000"/>
+              </a:lnSpc>
+              <a:spcBef>
+                <a:spcPts val="0"/>
+              </a:spcBef>
+              <a:spcAft>
+                <a:spcPts val="0"/>
+              </a:spcAft>
+              <a:buClrTx/>
+              <a:buSzTx/>
+              <a:buFontTx/>
+              <a:buNone/>
+              <a:tabLst/>
+              <a:defRPr/>
+            </a:pPr>
+            <a:r>
+              <a:rPr kumimoji="0" lang="en-US" sz="2400" b="1" i="0" u="none" strike="noStrike" kern="1200" cap="none" spc="0" normalizeH="0" baseline="0" noProof="0" dirty="0">
+                <a:ln>
+                  <a:noFill/>
+                </a:ln>
+                <a:solidFill>
+                  <a:srgbClr val="4472C4">
+                    <a:lumMod val="50000"/>
+                  </a:srgbClr>
+                </a:solidFill>
+                <a:effectLst/>
+                <a:uLnTx/>
+                <a:uFillTx/>
+                <a:latin typeface="Source Sans Pro" panose="020B0503030403020204" pitchFamily="34" charset="0"/>
+                <a:ea typeface="Source Sans Pro" panose="020B0503030403020204" pitchFamily="34" charset="0"/>
+                <a:cs typeface="+mn-cs"/>
+              </a:rPr>
+              <a:t>Find these slides online:</a:t>
+            </a:r>
+          </a:p>
+          <a:p>
+            <a:pPr marL="0" marR="0" lvl="0" indent="0" algn="r" defTabSz="914400" rtl="0" eaLnBrk="1" fontAlgn="auto" latinLnBrk="0" hangingPunct="1">
+              <a:lnSpc>
+                <a:spcPct val="100000"/>
+              </a:lnSpc>
+              <a:spcBef>
+                <a:spcPts val="0"/>
+              </a:spcBef>
+              <a:spcAft>
+                <a:spcPts val="0"/>
+              </a:spcAft>
+              <a:buClrTx/>
+              <a:buSzTx/>
+              <a:buFontTx/>
+              <a:buNone/>
+              <a:tabLst/>
+              <a:defRPr/>
+            </a:pPr>
+            <a:r>
+              <a:rPr kumimoji="0" lang="en-US" sz="2400" b="0" i="0" u="none" strike="noStrike" kern="1200" cap="none" spc="0" normalizeH="0" baseline="0" noProof="0" dirty="0">
+                <a:ln>
+                  <a:noFill/>
+                </a:ln>
+                <a:solidFill>
+                  <a:srgbClr val="4472C4">
+                    <a:lumMod val="50000"/>
+                  </a:srgbClr>
+                </a:solidFill>
+                <a:effectLst/>
+                <a:uLnTx/>
+                <a:uFillTx/>
+                <a:latin typeface="Source Sans Pro" panose="020B0503030403020204" pitchFamily="34" charset="0"/>
+                <a:ea typeface="Source Sans Pro" panose="020B0503030403020204" pitchFamily="34" charset="0"/>
+                <a:cs typeface="+mn-cs"/>
+                <a:hlinkClick r:id="rId2"/>
+              </a:rPr>
+              <a:t>github.com/DCS-training/</a:t>
+            </a:r>
+            <a:endParaRPr kumimoji="0" lang="en-US" sz="2400" b="0" i="0" u="none" strike="noStrike" kern="1200" cap="none" spc="0" normalizeH="0" baseline="0" noProof="0" dirty="0">
+              <a:ln>
+                <a:noFill/>
+              </a:ln>
+              <a:solidFill>
+                <a:srgbClr val="4472C4">
+                  <a:lumMod val="50000"/>
+                </a:srgbClr>
+              </a:solidFill>
+              <a:effectLst/>
+              <a:uLnTx/>
+              <a:uFillTx/>
+              <a:latin typeface="Source Sans Pro" panose="020B0503030403020204" pitchFamily="34" charset="0"/>
+              <a:ea typeface="Source Sans Pro" panose="020B0503030403020204" pitchFamily="34" charset="0"/>
+              <a:cs typeface="+mn-cs"/>
+              <a:hlinkClick r:id="" action="ppaction://noaction"/>
+            </a:endParaRPr>
+          </a:p>
+          <a:p>
+            <a:pPr marL="0" marR="0" lvl="0" indent="0" algn="r" defTabSz="914400" rtl="0" eaLnBrk="1" fontAlgn="auto" latinLnBrk="0" hangingPunct="1">
+              <a:lnSpc>
+                <a:spcPct val="100000"/>
+              </a:lnSpc>
+              <a:spcBef>
+                <a:spcPts val="0"/>
+              </a:spcBef>
+              <a:spcAft>
+                <a:spcPts val="0"/>
+              </a:spcAft>
+              <a:buClrTx/>
+              <a:buSzTx/>
+              <a:buFontTx/>
+              <a:buNone/>
+              <a:tabLst/>
+              <a:defRPr/>
+            </a:pPr>
+            <a:r>
+              <a:rPr kumimoji="0" lang="en-US" sz="2400" b="0" i="0" u="none" strike="noStrike" kern="1200" cap="none" spc="0" normalizeH="0" baseline="0" noProof="0" dirty="0">
+                <a:ln>
+                  <a:noFill/>
+                </a:ln>
+                <a:solidFill>
+                  <a:srgbClr val="4472C4">
+                    <a:lumMod val="50000"/>
+                  </a:srgbClr>
+                </a:solidFill>
+                <a:effectLst/>
+                <a:uLnTx/>
+                <a:uFillTx/>
+                <a:latin typeface="Source Sans Pro" panose="020B0503030403020204" pitchFamily="34" charset="0"/>
+                <a:ea typeface="Source Sans Pro" panose="020B0503030403020204" pitchFamily="34" charset="0"/>
+                <a:cs typeface="+mn-cs"/>
+                <a:hlinkClick r:id="" action="ppaction://noaction"/>
+              </a:rPr>
+              <a:t>data-analysis-in-python</a:t>
+            </a:r>
+            <a:r>
+              <a:rPr kumimoji="0" lang="en-US" sz="2400" b="0" i="0" u="none" strike="noStrike" kern="1200" cap="none" spc="0" normalizeH="0" baseline="0" noProof="0" dirty="0">
+                <a:ln>
+                  <a:noFill/>
+                </a:ln>
+                <a:solidFill>
+                  <a:srgbClr val="4472C4">
+                    <a:lumMod val="50000"/>
+                  </a:srgbClr>
+                </a:solidFill>
+                <a:effectLst/>
+                <a:uLnTx/>
+                <a:uFillTx/>
+                <a:latin typeface="Source Sans Pro" panose="020B0503030403020204" pitchFamily="34" charset="0"/>
+                <a:ea typeface="Source Sans Pro" panose="020B0503030403020204" pitchFamily="34" charset="0"/>
+                <a:cs typeface="+mn-cs"/>
+                <a:hlinkClick r:id="rId2"/>
+              </a:rPr>
+              <a:t> </a:t>
+            </a:r>
+            <a:endParaRPr kumimoji="0" lang="en-US" sz="2400" b="0" i="0" u="none" strike="noStrike" kern="1200" cap="none" spc="0" normalizeH="0" baseline="0" noProof="0" dirty="0">
+              <a:ln>
+                <a:noFill/>
+              </a:ln>
+              <a:solidFill>
+                <a:srgbClr val="4472C4">
+                  <a:lumMod val="50000"/>
+                </a:srgbClr>
+              </a:solidFill>
+              <a:effectLst/>
+              <a:uLnTx/>
+              <a:uFillTx/>
+              <a:latin typeface="Source Sans Pro" panose="020B0503030403020204" pitchFamily="34" charset="0"/>
+              <a:ea typeface="Source Sans Pro" panose="020B0503030403020204" pitchFamily="34" charset="0"/>
+              <a:cs typeface="+mn-cs"/>
+            </a:endParaRPr>
+          </a:p>
+        </p:txBody>
+      </p:sp>
+      <p:pic>
+        <p:nvPicPr>
+          <p:cNvPr id="7" name="Picture 6" descr="A qr code on a white background&#10;&#10;Description automatically generated">
+            <a:extLst>
+              <a:ext uri="{FF2B5EF4-FFF2-40B4-BE49-F238E27FC236}">
+                <a16:creationId xmlns:a16="http://schemas.microsoft.com/office/drawing/2014/main" id="{28BFA8B7-C1F6-825B-476B-546A21D806A5}"/>
+              </a:ext>
+            </a:extLst>
+          </p:cNvPr>
+          <p:cNvPicPr>
+            <a:picLocks noChangeAspect="1"/>
+          </p:cNvPicPr>
+          <p:nvPr/>
+        </p:nvPicPr>
+        <p:blipFill>
+          <a:blip r:embed="rId3" cstate="print">
+            <a:extLst>
+              <a:ext uri="{28A0092B-C50C-407E-A947-70E740481C1C}">
+                <a14:useLocalDpi xmlns:a14="http://schemas.microsoft.com/office/drawing/2010/main" val="0"/>
+              </a:ext>
+            </a:extLst>
+          </a:blip>
+          <a:stretch>
+            <a:fillRect/>
+          </a:stretch>
+        </p:blipFill>
+        <p:spPr>
+          <a:xfrm>
+            <a:off x="10582883" y="4369340"/>
+            <a:ext cx="1541834" cy="1541834"/>
+          </a:xfrm>
+          <a:prstGeom prst="rect">
+            <a:avLst/>
+          </a:prstGeom>
+        </p:spPr>
+      </p:pic>
+    </p:spTree>
+    <p:extLst>
+      <p:ext uri="{BB962C8B-B14F-4D97-AF65-F5344CB8AC3E}">
+        <p14:creationId xmlns:p14="http://schemas.microsoft.com/office/powerpoint/2010/main" val="2544442811"/>
       </p:ext>
     </p:extLst>
   </p:cSld>
@@ -11013,6 +10380,43 @@
 </file>
 
 <file path=customXml/item1.xml><?xml version="1.0" encoding="utf-8"?>
+<p:properties xmlns:p="http://schemas.microsoft.com/office/2006/metadata/properties" xmlns:xsi="http://www.w3.org/2001/XMLSchema-instance" xmlns:pc="http://schemas.microsoft.com/office/infopath/2007/PartnerControls">
+  <documentManagement>
+    <SharedWithUsers xmlns="e0533433-c614-42f1-a6db-1e117b426f00">
+      <UserInfo>
+        <DisplayName>Laura Donati</DisplayName>
+        <AccountId>35556</AccountId>
+        <AccountType/>
+      </UserInfo>
+      <UserInfo>
+        <DisplayName>Javiera Alfaro Chat</DisplayName>
+        <AccountId>92730</AccountId>
+        <AccountType/>
+      </UserInfo>
+      <UserInfo>
+        <DisplayName>Lucia Michielin</DisplayName>
+        <AccountId>83338</AccountId>
+        <AccountType/>
+      </UserInfo>
+    </SharedWithUsers>
+    <lcf76f155ced4ddcb4097134ff3c332f xmlns="a4cecb87-7127-4cec-8ade-f39cabdda460">
+      <Terms xmlns="http://schemas.microsoft.com/office/infopath/2007/PartnerControls"/>
+    </lcf76f155ced4ddcb4097134ff3c332f>
+    <TaxCatchAll xmlns="e0533433-c614-42f1-a6db-1e117b426f00" xsi:nil="true"/>
+  </documentManagement>
+</p:properties>
+</file>
+
+<file path=customXml/item2.xml><?xml version="1.0" encoding="utf-8"?>
+<?mso-contentType ?>
+<FormTemplates xmlns="http://schemas.microsoft.com/sharepoint/v3/contenttype/forms">
+  <Display>DocumentLibraryForm</Display>
+  <Edit>DocumentLibraryForm</Edit>
+  <New>DocumentLibraryForm</New>
+</FormTemplates>
+</file>
+
+<file path=customXml/item3.xml><?xml version="1.0" encoding="utf-8"?>
 <ct:contentTypeSchema xmlns:ct="http://schemas.microsoft.com/office/2006/metadata/contentType" xmlns:ma="http://schemas.microsoft.com/office/2006/metadata/properties/metaAttributes" ct:_="" ma:_="" ma:contentTypeName="Document" ma:contentTypeID="0x010100ADF3C4344107B142896AFF4BAB57AEE6" ma:contentTypeVersion="18" ma:contentTypeDescription="Create a new document." ma:contentTypeScope="" ma:versionID="33cfc325086f35f3cd5060a0b91ae003">
   <xsd:schema xmlns:xsd="http://www.w3.org/2001/XMLSchema" xmlns:xs="http://www.w3.org/2001/XMLSchema" xmlns:p="http://schemas.microsoft.com/office/2006/metadata/properties" xmlns:ns2="a4cecb87-7127-4cec-8ade-f39cabdda460" xmlns:ns3="e0533433-c614-42f1-a6db-1e117b426f00" targetNamespace="http://schemas.microsoft.com/office/2006/metadata/properties" ma:root="true" ma:fieldsID="25d766a1fde2f4a0c787f855adf6439a" ns2:_="" ns3:_="">
     <xsd:import namespace="a4cecb87-7127-4cec-8ade-f39cabdda460"/>
@@ -11267,44 +10671,34 @@
 </ct:contentTypeSchema>
 </file>
 
-<file path=customXml/item2.xml><?xml version="1.0" encoding="utf-8"?>
-<?mso-contentType ?>
-<FormTemplates xmlns="http://schemas.microsoft.com/sharepoint/v3/contenttype/forms">
-  <Display>DocumentLibraryForm</Display>
-  <Edit>DocumentLibraryForm</Edit>
-  <New>DocumentLibraryForm</New>
-</FormTemplates>
+<file path=customXml/itemProps1.xml><?xml version="1.0" encoding="utf-8"?>
+<ds:datastoreItem xmlns:ds="http://schemas.openxmlformats.org/officeDocument/2006/customXml" ds:itemID="{A0FD7CE9-E207-468D-9663-B40EDE0A8FE3}">
+  <ds:schemaRefs>
+    <ds:schemaRef ds:uri="http://schemas.microsoft.com/office/2006/documentManagement/types"/>
+    <ds:schemaRef ds:uri="http://purl.org/dc/terms/"/>
+    <ds:schemaRef ds:uri="a0fd3e0f-4486-43f0-8cc0-a78c9c012b87"/>
+    <ds:schemaRef ds:uri="http://purl.org/dc/dcmitype/"/>
+    <ds:schemaRef ds:uri="http://schemas.microsoft.com/office/2006/metadata/properties"/>
+    <ds:schemaRef ds:uri="http://purl.org/dc/elements/1.1/"/>
+    <ds:schemaRef ds:uri="http://www.w3.org/XML/1998/namespace"/>
+    <ds:schemaRef ds:uri="985e917c-2ab5-46ae-8368-477a47f62355"/>
+    <ds:schemaRef ds:uri="http://schemas.microsoft.com/office/infopath/2007/PartnerControls"/>
+    <ds:schemaRef ds:uri="http://schemas.openxmlformats.org/package/2006/metadata/core-properties"/>
+    <ds:schemaRef ds:uri="e0533433-c614-42f1-a6db-1e117b426f00"/>
+    <ds:schemaRef ds:uri="a4cecb87-7127-4cec-8ade-f39cabdda460"/>
+  </ds:schemaRefs>
+</ds:datastoreItem>
 </file>
 
-<file path=customXml/item3.xml><?xml version="1.0" encoding="utf-8"?>
-<p:properties xmlns:p="http://schemas.microsoft.com/office/2006/metadata/properties" xmlns:xsi="http://www.w3.org/2001/XMLSchema-instance" xmlns:pc="http://schemas.microsoft.com/office/infopath/2007/PartnerControls">
-  <documentManagement>
-    <SharedWithUsers xmlns="e0533433-c614-42f1-a6db-1e117b426f00">
-      <UserInfo>
-        <DisplayName>Laura Donati</DisplayName>
-        <AccountId>35556</AccountId>
-        <AccountType/>
-      </UserInfo>
-      <UserInfo>
-        <DisplayName>Javiera Alfaro Chat</DisplayName>
-        <AccountId>92730</AccountId>
-        <AccountType/>
-      </UserInfo>
-      <UserInfo>
-        <DisplayName>Lucia Michielin</DisplayName>
-        <AccountId>83338</AccountId>
-        <AccountType/>
-      </UserInfo>
-    </SharedWithUsers>
-    <lcf76f155ced4ddcb4097134ff3c332f xmlns="a4cecb87-7127-4cec-8ade-f39cabdda460">
-      <Terms xmlns="http://schemas.microsoft.com/office/infopath/2007/PartnerControls"/>
-    </lcf76f155ced4ddcb4097134ff3c332f>
-    <TaxCatchAll xmlns="e0533433-c614-42f1-a6db-1e117b426f00" xsi:nil="true"/>
-  </documentManagement>
-</p:properties>
+<file path=customXml/itemProps2.xml><?xml version="1.0" encoding="utf-8"?>
+<ds:datastoreItem xmlns:ds="http://schemas.openxmlformats.org/officeDocument/2006/customXml" ds:itemID="{B4671BF0-864A-44EB-8D90-267EAE0E8E13}">
+  <ds:schemaRefs>
+    <ds:schemaRef ds:uri="http://schemas.microsoft.com/sharepoint/v3/contenttype/forms"/>
+  </ds:schemaRefs>
+</ds:datastoreItem>
 </file>
 
-<file path=customXml/itemProps1.xml><?xml version="1.0" encoding="utf-8"?>
+<file path=customXml/itemProps3.xml><?xml version="1.0" encoding="utf-8"?>
 <ds:datastoreItem xmlns:ds="http://schemas.openxmlformats.org/officeDocument/2006/customXml" ds:itemID="{0A828580-16C7-4FCC-A83B-65671754017E}">
   <ds:schemaRefs>
     <ds:schemaRef ds:uri="http://schemas.microsoft.com/office/2006/metadata/contentType"/>
@@ -11321,31 +10715,4 @@
     <ds:schemaRef ds:uri="http://schemas.microsoft.com/internal/obd"/>
   </ds:schemaRefs>
 </ds:datastoreItem>
-</file>
-
-<file path=customXml/itemProps2.xml><?xml version="1.0" encoding="utf-8"?>
-<ds:datastoreItem xmlns:ds="http://schemas.openxmlformats.org/officeDocument/2006/customXml" ds:itemID="{B4671BF0-864A-44EB-8D90-267EAE0E8E13}">
-  <ds:schemaRefs>
-    <ds:schemaRef ds:uri="http://schemas.microsoft.com/sharepoint/v3/contenttype/forms"/>
-  </ds:schemaRefs>
-</ds:datastoreItem>
-</file>
-
-<file path=customXml/itemProps3.xml><?xml version="1.0" encoding="utf-8"?>
-<ds:datastoreItem xmlns:ds="http://schemas.openxmlformats.org/officeDocument/2006/customXml" ds:itemID="{A0FD7CE9-E207-468D-9663-B40EDE0A8FE3}">
-  <ds:schemaRefs>
-    <ds:schemaRef ds:uri="http://schemas.microsoft.com/office/2006/documentManagement/types"/>
-    <ds:schemaRef ds:uri="http://purl.org/dc/terms/"/>
-    <ds:schemaRef ds:uri="a0fd3e0f-4486-43f0-8cc0-a78c9c012b87"/>
-    <ds:schemaRef ds:uri="http://purl.org/dc/dcmitype/"/>
-    <ds:schemaRef ds:uri="http://schemas.microsoft.com/office/2006/metadata/properties"/>
-    <ds:schemaRef ds:uri="http://purl.org/dc/elements/1.1/"/>
-    <ds:schemaRef ds:uri="http://www.w3.org/XML/1998/namespace"/>
-    <ds:schemaRef ds:uri="985e917c-2ab5-46ae-8368-477a47f62355"/>
-    <ds:schemaRef ds:uri="http://schemas.microsoft.com/office/infopath/2007/PartnerControls"/>
-    <ds:schemaRef ds:uri="http://schemas.openxmlformats.org/package/2006/metadata/core-properties"/>
-    <ds:schemaRef ds:uri="e0533433-c614-42f1-a6db-1e117b426f00"/>
-    <ds:schemaRef ds:uri="a4cecb87-7127-4cec-8ade-f39cabdda460"/>
-  </ds:schemaRefs>
-</ds:datastoreItem>
 </file>
</xml_diff>